<commit_message>
more plotting for assigment
</commit_message>
<xml_diff>
--- a/0093_assignment_01/0093 Assignment.pptx
+++ b/0093_assignment_01/0093 Assignment.pptx
@@ -244,7 +244,7 @@
           <a:p>
             <a:fld id="{0779C772-2EC6-45AD-A8CD-82CEDEFAAAA4}" type="datetimeFigureOut">
               <a:rPr lang="en-GB" smtClean="0"/>
-              <a:t>20/11/2023</a:t>
+              <a:t>21/11/2023</a:t>
             </a:fld>
             <a:endParaRPr lang="en-GB" dirty="0"/>
           </a:p>
@@ -414,7 +414,7 @@
           <a:p>
             <a:fld id="{0779C772-2EC6-45AD-A8CD-82CEDEFAAAA4}" type="datetimeFigureOut">
               <a:rPr lang="en-GB" smtClean="0"/>
-              <a:t>20/11/2023</a:t>
+              <a:t>21/11/2023</a:t>
             </a:fld>
             <a:endParaRPr lang="en-GB" dirty="0"/>
           </a:p>
@@ -594,7 +594,7 @@
           <a:p>
             <a:fld id="{0779C772-2EC6-45AD-A8CD-82CEDEFAAAA4}" type="datetimeFigureOut">
               <a:rPr lang="en-GB" smtClean="0"/>
-              <a:t>20/11/2023</a:t>
+              <a:t>21/11/2023</a:t>
             </a:fld>
             <a:endParaRPr lang="en-GB" dirty="0"/>
           </a:p>
@@ -764,7 +764,7 @@
           <a:p>
             <a:fld id="{0779C772-2EC6-45AD-A8CD-82CEDEFAAAA4}" type="datetimeFigureOut">
               <a:rPr lang="en-GB" smtClean="0"/>
-              <a:t>20/11/2023</a:t>
+              <a:t>21/11/2023</a:t>
             </a:fld>
             <a:endParaRPr lang="en-GB" dirty="0"/>
           </a:p>
@@ -1008,7 +1008,7 @@
           <a:p>
             <a:fld id="{0779C772-2EC6-45AD-A8CD-82CEDEFAAAA4}" type="datetimeFigureOut">
               <a:rPr lang="en-GB" smtClean="0"/>
-              <a:t>20/11/2023</a:t>
+              <a:t>21/11/2023</a:t>
             </a:fld>
             <a:endParaRPr lang="en-GB" dirty="0"/>
           </a:p>
@@ -1240,7 +1240,7 @@
           <a:p>
             <a:fld id="{0779C772-2EC6-45AD-A8CD-82CEDEFAAAA4}" type="datetimeFigureOut">
               <a:rPr lang="en-GB" smtClean="0"/>
-              <a:t>20/11/2023</a:t>
+              <a:t>21/11/2023</a:t>
             </a:fld>
             <a:endParaRPr lang="en-GB" dirty="0"/>
           </a:p>
@@ -1607,7 +1607,7 @@
           <a:p>
             <a:fld id="{0779C772-2EC6-45AD-A8CD-82CEDEFAAAA4}" type="datetimeFigureOut">
               <a:rPr lang="en-GB" smtClean="0"/>
-              <a:t>20/11/2023</a:t>
+              <a:t>21/11/2023</a:t>
             </a:fld>
             <a:endParaRPr lang="en-GB" dirty="0"/>
           </a:p>
@@ -1725,7 +1725,7 @@
           <a:p>
             <a:fld id="{0779C772-2EC6-45AD-A8CD-82CEDEFAAAA4}" type="datetimeFigureOut">
               <a:rPr lang="en-GB" smtClean="0"/>
-              <a:t>20/11/2023</a:t>
+              <a:t>21/11/2023</a:t>
             </a:fld>
             <a:endParaRPr lang="en-GB" dirty="0"/>
           </a:p>
@@ -1820,7 +1820,7 @@
           <a:p>
             <a:fld id="{0779C772-2EC6-45AD-A8CD-82CEDEFAAAA4}" type="datetimeFigureOut">
               <a:rPr lang="en-GB" smtClean="0"/>
-              <a:t>20/11/2023</a:t>
+              <a:t>21/11/2023</a:t>
             </a:fld>
             <a:endParaRPr lang="en-GB" dirty="0"/>
           </a:p>
@@ -2097,7 +2097,7 @@
           <a:p>
             <a:fld id="{0779C772-2EC6-45AD-A8CD-82CEDEFAAAA4}" type="datetimeFigureOut">
               <a:rPr lang="en-GB" smtClean="0"/>
-              <a:t>20/11/2023</a:t>
+              <a:t>21/11/2023</a:t>
             </a:fld>
             <a:endParaRPr lang="en-GB" dirty="0"/>
           </a:p>
@@ -2353,7 +2353,7 @@
           <a:p>
             <a:fld id="{0779C772-2EC6-45AD-A8CD-82CEDEFAAAA4}" type="datetimeFigureOut">
               <a:rPr lang="en-GB" smtClean="0"/>
-              <a:t>20/11/2023</a:t>
+              <a:t>21/11/2023</a:t>
             </a:fld>
             <a:endParaRPr lang="en-GB" dirty="0"/>
           </a:p>
@@ -2566,7 +2566,7 @@
           <a:p>
             <a:fld id="{0779C772-2EC6-45AD-A8CD-82CEDEFAAAA4}" type="datetimeFigureOut">
               <a:rPr lang="en-GB" smtClean="0"/>
-              <a:t>20/11/2023</a:t>
+              <a:t>21/11/2023</a:t>
             </a:fld>
             <a:endParaRPr lang="en-GB" dirty="0"/>
           </a:p>
@@ -3600,10 +3600,10 @@
       </p:grpSpPr>
       <p:pic>
         <p:nvPicPr>
-          <p:cNvPr id="7" name="Picture 6" descr="A map of england with different colored spots&#10;&#10;Description automatically generated">
+          <p:cNvPr id="9" name="Picture 8">
             <a:extLst>
               <a:ext uri="{FF2B5EF4-FFF2-40B4-BE49-F238E27FC236}">
-                <a16:creationId xmlns:a16="http://schemas.microsoft.com/office/drawing/2014/main" id="{4B0FFB20-D463-9CEC-170F-8CED350BD577}"/>
+                <a16:creationId xmlns:a16="http://schemas.microsoft.com/office/drawing/2014/main" id="{CA6BBE19-0871-0D0D-1840-8F2B1FCA0961}"/>
               </a:ext>
             </a:extLst>
           </p:cNvPr>
@@ -3620,14 +3620,13 @@
               </a:ext>
             </a:extLst>
           </a:blip>
-          <a:stretch>
-            <a:fillRect/>
-          </a:stretch>
+          <a:srcRect/>
+          <a:stretch/>
         </p:blipFill>
         <p:spPr>
           <a:xfrm>
-            <a:off x="0" y="0"/>
-            <a:ext cx="4800600" cy="6400800"/>
+            <a:off x="6597650" y="9349741"/>
+            <a:ext cx="2876550" cy="3451860"/>
           </a:xfrm>
           <a:prstGeom prst="rect">
             <a:avLst/>
@@ -3636,10 +3635,10 @@
       </p:pic>
       <p:pic>
         <p:nvPicPr>
-          <p:cNvPr id="9" name="Picture 8" descr="A map of england with numbers and text&#10;&#10;Description automatically generated">
+          <p:cNvPr id="13" name="Picture 12">
             <a:extLst>
               <a:ext uri="{FF2B5EF4-FFF2-40B4-BE49-F238E27FC236}">
-                <a16:creationId xmlns:a16="http://schemas.microsoft.com/office/drawing/2014/main" id="{CA6BBE19-0871-0D0D-1840-8F2B1FCA0961}"/>
+                <a16:creationId xmlns:a16="http://schemas.microsoft.com/office/drawing/2014/main" id="{8E10F4AF-6055-9A02-0F9B-A5EF536BBACC}"/>
               </a:ext>
             </a:extLst>
           </p:cNvPr>
@@ -3656,14 +3655,13 @@
               </a:ext>
             </a:extLst>
           </a:blip>
-          <a:stretch>
-            <a:fillRect/>
-          </a:stretch>
+          <a:srcRect/>
+          <a:stretch/>
         </p:blipFill>
         <p:spPr>
           <a:xfrm>
-            <a:off x="4800599" y="0"/>
-            <a:ext cx="4800603" cy="6400804"/>
+            <a:off x="3362325" y="9349741"/>
+            <a:ext cx="2876550" cy="3451859"/>
           </a:xfrm>
           <a:prstGeom prst="rect">
             <a:avLst/>
@@ -3672,10 +3670,10 @@
       </p:pic>
       <p:pic>
         <p:nvPicPr>
-          <p:cNvPr id="11" name="Picture 10">
+          <p:cNvPr id="5" name="Picture 4">
             <a:extLst>
               <a:ext uri="{FF2B5EF4-FFF2-40B4-BE49-F238E27FC236}">
-                <a16:creationId xmlns:a16="http://schemas.microsoft.com/office/drawing/2014/main" id="{A4FBB49B-93E2-9E77-6FE1-BB922D59A83D}"/>
+                <a16:creationId xmlns:a16="http://schemas.microsoft.com/office/drawing/2014/main" id="{AC95BB3C-F1C2-6BD5-490E-604D2CCFAC1B}"/>
               </a:ext>
             </a:extLst>
           </p:cNvPr>
@@ -3692,13 +3690,13 @@
               </a:ext>
             </a:extLst>
           </a:blip>
-          <a:srcRect/>
+          <a:srcRect t="1455" b="1455"/>
           <a:stretch/>
         </p:blipFill>
         <p:spPr>
           <a:xfrm>
-            <a:off x="-5" y="6400801"/>
-            <a:ext cx="4800599" cy="6400798"/>
+            <a:off x="0" y="0"/>
+            <a:ext cx="9601200" cy="9321800"/>
           </a:xfrm>
           <a:prstGeom prst="rect">
             <a:avLst/>
@@ -3707,10 +3705,10 @@
       </p:pic>
       <p:pic>
         <p:nvPicPr>
-          <p:cNvPr id="13" name="Picture 12" descr="A map of england with numbers and text&#10;&#10;Description automatically generated">
+          <p:cNvPr id="7" name="Picture 6">
             <a:extLst>
               <a:ext uri="{FF2B5EF4-FFF2-40B4-BE49-F238E27FC236}">
-                <a16:creationId xmlns:a16="http://schemas.microsoft.com/office/drawing/2014/main" id="{8E10F4AF-6055-9A02-0F9B-A5EF536BBACC}"/>
+                <a16:creationId xmlns:a16="http://schemas.microsoft.com/office/drawing/2014/main" id="{4B0FFB20-D463-9CEC-170F-8CED350BD577}"/>
               </a:ext>
             </a:extLst>
           </p:cNvPr>
@@ -3727,14 +3725,13 @@
               </a:ext>
             </a:extLst>
           </a:blip>
-          <a:stretch>
-            <a:fillRect/>
-          </a:stretch>
+          <a:srcRect/>
+          <a:stretch/>
         </p:blipFill>
         <p:spPr>
           <a:xfrm>
-            <a:off x="4800594" y="6400802"/>
-            <a:ext cx="4800599" cy="6400798"/>
+            <a:off x="127000" y="9349741"/>
+            <a:ext cx="2876550" cy="3451859"/>
           </a:xfrm>
           <a:prstGeom prst="rect">
             <a:avLst/>

</xml_diff>